<commit_message>
Fixed Points and Non-Fixed Points of Haskell Functors
</commit_message>
<xml_diff>
--- a/assets/images/algebra.pptx
+++ b/assets/images/algebra.pptx
@@ -9,6 +9,8 @@
     <p:sldId id="257" r:id="rId3"/>
     <p:sldId id="258" r:id="rId4"/>
     <p:sldId id="259" r:id="rId5"/>
+    <p:sldId id="260" r:id="rId6"/>
+    <p:sldId id="261" r:id="rId7"/>
   </p:sldIdLst>
   <p:sldSz cx="12192000" cy="6858000"/>
   <p:notesSz cx="6858000" cy="9144000"/>
@@ -262,7 +264,7 @@
           <a:p>
             <a:fld id="{F1CE2E56-390B-0D40-B23D-733986BC3B84}" type="datetimeFigureOut">
               <a:rPr lang="en-US" smtClean="0"/>
-              <a:t>7/14/19</a:t>
+              <a:t>8/18/19</a:t>
             </a:fld>
             <a:endParaRPr lang="en-US"/>
           </a:p>
@@ -460,7 +462,7 @@
           <a:p>
             <a:fld id="{F1CE2E56-390B-0D40-B23D-733986BC3B84}" type="datetimeFigureOut">
               <a:rPr lang="en-US" smtClean="0"/>
-              <a:t>7/14/19</a:t>
+              <a:t>8/18/19</a:t>
             </a:fld>
             <a:endParaRPr lang="en-US"/>
           </a:p>
@@ -668,7 +670,7 @@
           <a:p>
             <a:fld id="{F1CE2E56-390B-0D40-B23D-733986BC3B84}" type="datetimeFigureOut">
               <a:rPr lang="en-US" smtClean="0"/>
-              <a:t>7/14/19</a:t>
+              <a:t>8/18/19</a:t>
             </a:fld>
             <a:endParaRPr lang="en-US"/>
           </a:p>
@@ -866,7 +868,7 @@
           <a:p>
             <a:fld id="{F1CE2E56-390B-0D40-B23D-733986BC3B84}" type="datetimeFigureOut">
               <a:rPr lang="en-US" smtClean="0"/>
-              <a:t>7/14/19</a:t>
+              <a:t>8/18/19</a:t>
             </a:fld>
             <a:endParaRPr lang="en-US"/>
           </a:p>
@@ -1141,7 +1143,7 @@
           <a:p>
             <a:fld id="{F1CE2E56-390B-0D40-B23D-733986BC3B84}" type="datetimeFigureOut">
               <a:rPr lang="en-US" smtClean="0"/>
-              <a:t>7/14/19</a:t>
+              <a:t>8/18/19</a:t>
             </a:fld>
             <a:endParaRPr lang="en-US"/>
           </a:p>
@@ -1406,7 +1408,7 @@
           <a:p>
             <a:fld id="{F1CE2E56-390B-0D40-B23D-733986BC3B84}" type="datetimeFigureOut">
               <a:rPr lang="en-US" smtClean="0"/>
-              <a:t>7/14/19</a:t>
+              <a:t>8/18/19</a:t>
             </a:fld>
             <a:endParaRPr lang="en-US"/>
           </a:p>
@@ -1818,7 +1820,7 @@
           <a:p>
             <a:fld id="{F1CE2E56-390B-0D40-B23D-733986BC3B84}" type="datetimeFigureOut">
               <a:rPr lang="en-US" smtClean="0"/>
-              <a:t>7/14/19</a:t>
+              <a:t>8/18/19</a:t>
             </a:fld>
             <a:endParaRPr lang="en-US"/>
           </a:p>
@@ -1959,7 +1961,7 @@
           <a:p>
             <a:fld id="{F1CE2E56-390B-0D40-B23D-733986BC3B84}" type="datetimeFigureOut">
               <a:rPr lang="en-US" smtClean="0"/>
-              <a:t>7/14/19</a:t>
+              <a:t>8/18/19</a:t>
             </a:fld>
             <a:endParaRPr lang="en-US"/>
           </a:p>
@@ -2072,7 +2074,7 @@
           <a:p>
             <a:fld id="{F1CE2E56-390B-0D40-B23D-733986BC3B84}" type="datetimeFigureOut">
               <a:rPr lang="en-US" smtClean="0"/>
-              <a:t>7/14/19</a:t>
+              <a:t>8/18/19</a:t>
             </a:fld>
             <a:endParaRPr lang="en-US"/>
           </a:p>
@@ -2383,7 +2385,7 @@
           <a:p>
             <a:fld id="{F1CE2E56-390B-0D40-B23D-733986BC3B84}" type="datetimeFigureOut">
               <a:rPr lang="en-US" smtClean="0"/>
-              <a:t>7/14/19</a:t>
+              <a:t>8/18/19</a:t>
             </a:fld>
             <a:endParaRPr lang="en-US"/>
           </a:p>
@@ -2671,7 +2673,7 @@
           <a:p>
             <a:fld id="{F1CE2E56-390B-0D40-B23D-733986BC3B84}" type="datetimeFigureOut">
               <a:rPr lang="en-US" smtClean="0"/>
-              <a:t>7/14/19</a:t>
+              <a:t>8/18/19</a:t>
             </a:fld>
             <a:endParaRPr lang="en-US"/>
           </a:p>
@@ -2912,7 +2914,7 @@
           <a:p>
             <a:fld id="{F1CE2E56-390B-0D40-B23D-733986BC3B84}" type="datetimeFigureOut">
               <a:rPr lang="en-US" smtClean="0"/>
-              <a:t>7/14/19</a:t>
+              <a:t>8/18/19</a:t>
             </a:fld>
             <a:endParaRPr lang="en-US"/>
           </a:p>
@@ -5887,6 +5889,1034 @@
 </p:sld>
 </file>
 
+<file path=ppt/slides/slide5.xml><?xml version="1.0" encoding="utf-8"?>
+<p:sld xmlns:a="http://schemas.openxmlformats.org/drawingml/2006/main" xmlns:r="http://schemas.openxmlformats.org/officeDocument/2006/relationships" xmlns:p="http://schemas.openxmlformats.org/presentationml/2006/main">
+  <p:cSld>
+    <p:spTree>
+      <p:nvGrpSpPr>
+        <p:cNvPr id="1" name=""/>
+        <p:cNvGrpSpPr/>
+        <p:nvPr/>
+      </p:nvGrpSpPr>
+      <p:grpSpPr>
+        <a:xfrm>
+          <a:off x="0" y="0"/>
+          <a:ext cx="0" cy="0"/>
+          <a:chOff x="0" y="0"/>
+          <a:chExt cx="0" cy="0"/>
+        </a:xfrm>
+      </p:grpSpPr>
+      <p:sp>
+        <p:nvSpPr>
+          <p:cNvPr id="4" name="TextBox 3">
+            <a:extLst>
+              <a:ext uri="{FF2B5EF4-FFF2-40B4-BE49-F238E27FC236}">
+                <a16:creationId xmlns:a16="http://schemas.microsoft.com/office/drawing/2014/main" id="{01C06EB6-1DC1-C449-9E03-E197EC041562}"/>
+              </a:ext>
+            </a:extLst>
+          </p:cNvPr>
+          <p:cNvSpPr txBox="1"/>
+          <p:nvPr/>
+        </p:nvSpPr>
+        <p:spPr>
+          <a:xfrm>
+            <a:off x="4070598" y="2776372"/>
+            <a:ext cx="1385455" cy="307777"/>
+          </a:xfrm>
+          <a:prstGeom prst="rect">
+            <a:avLst/>
+          </a:prstGeom>
+          <a:noFill/>
+        </p:spPr>
+        <p:txBody>
+          <a:bodyPr wrap="square" rtlCol="0">
+            <a:spAutoFit/>
+          </a:bodyPr>
+          <a:lstStyle/>
+          <a:p>
+            <a:pPr algn="ctr"/>
+            <a:r>
+              <a:rPr lang="en-US" sz="1400" dirty="0" err="1">
+                <a:latin typeface="CMU Serif Roman" panose="02000603000000000000" pitchFamily="2" charset="0"/>
+                <a:ea typeface="CMU Serif Roman" panose="02000603000000000000" pitchFamily="2" charset="0"/>
+                <a:cs typeface="CMU Serif Roman" panose="02000603000000000000" pitchFamily="2" charset="0"/>
+              </a:rPr>
+              <a:t>Succ</a:t>
+            </a:r>
+            <a:r>
+              <a:rPr lang="en-US" sz="1400" dirty="0">
+                <a:latin typeface="CMU Serif Roman" panose="02000603000000000000" pitchFamily="2" charset="0"/>
+                <a:ea typeface="CMU Serif Roman" panose="02000603000000000000" pitchFamily="2" charset="0"/>
+                <a:cs typeface="CMU Serif Roman" panose="02000603000000000000" pitchFamily="2" charset="0"/>
+              </a:rPr>
+              <a:t> (</a:t>
+            </a:r>
+            <a:r>
+              <a:rPr lang="en-US" sz="1400" dirty="0" err="1">
+                <a:latin typeface="CMU Serif Roman" panose="02000603000000000000" pitchFamily="2" charset="0"/>
+                <a:ea typeface="CMU Serif Roman" panose="02000603000000000000" pitchFamily="2" charset="0"/>
+                <a:cs typeface="CMU Serif Roman" panose="02000603000000000000" pitchFamily="2" charset="0"/>
+              </a:rPr>
+              <a:t>Succ</a:t>
+            </a:r>
+            <a:r>
+              <a:rPr lang="en-US" sz="1400" dirty="0">
+                <a:latin typeface="CMU Serif Roman" panose="02000603000000000000" pitchFamily="2" charset="0"/>
+                <a:ea typeface="CMU Serif Roman" panose="02000603000000000000" pitchFamily="2" charset="0"/>
+                <a:cs typeface="CMU Serif Roman" panose="02000603000000000000" pitchFamily="2" charset="0"/>
+              </a:rPr>
+              <a:t> ⊥)</a:t>
+            </a:r>
+          </a:p>
+        </p:txBody>
+      </p:sp>
+      <p:sp>
+        <p:nvSpPr>
+          <p:cNvPr id="5" name="TextBox 4">
+            <a:extLst>
+              <a:ext uri="{FF2B5EF4-FFF2-40B4-BE49-F238E27FC236}">
+                <a16:creationId xmlns:a16="http://schemas.microsoft.com/office/drawing/2014/main" id="{5C291FEA-94B8-D84D-9B7F-066E6AA6ED5F}"/>
+              </a:ext>
+            </a:extLst>
+          </p:cNvPr>
+          <p:cNvSpPr txBox="1"/>
+          <p:nvPr/>
+        </p:nvSpPr>
+        <p:spPr>
+          <a:xfrm>
+            <a:off x="3809505" y="3375538"/>
+            <a:ext cx="835894" cy="307777"/>
+          </a:xfrm>
+          <a:prstGeom prst="rect">
+            <a:avLst/>
+          </a:prstGeom>
+          <a:noFill/>
+        </p:spPr>
+        <p:txBody>
+          <a:bodyPr wrap="square" rtlCol="0">
+            <a:spAutoFit/>
+          </a:bodyPr>
+          <a:lstStyle/>
+          <a:p>
+            <a:pPr algn="ctr"/>
+            <a:r>
+              <a:rPr lang="en-US" sz="1400" dirty="0" err="1">
+                <a:latin typeface="CMU Serif Roman" panose="02000603000000000000" pitchFamily="2" charset="0"/>
+                <a:ea typeface="CMU Serif Roman" panose="02000603000000000000" pitchFamily="2" charset="0"/>
+                <a:cs typeface="CMU Serif Roman" panose="02000603000000000000" pitchFamily="2" charset="0"/>
+              </a:rPr>
+              <a:t>Succ</a:t>
+            </a:r>
+            <a:r>
+              <a:rPr lang="en-US" sz="1400" dirty="0">
+                <a:latin typeface="CMU Serif Roman" panose="02000603000000000000" pitchFamily="2" charset="0"/>
+                <a:ea typeface="CMU Serif Roman" panose="02000603000000000000" pitchFamily="2" charset="0"/>
+                <a:cs typeface="CMU Serif Roman" panose="02000603000000000000" pitchFamily="2" charset="0"/>
+              </a:rPr>
+              <a:t> ⊥</a:t>
+            </a:r>
+          </a:p>
+        </p:txBody>
+      </p:sp>
+      <p:sp>
+        <p:nvSpPr>
+          <p:cNvPr id="6" name="TextBox 5">
+            <a:extLst>
+              <a:ext uri="{FF2B5EF4-FFF2-40B4-BE49-F238E27FC236}">
+                <a16:creationId xmlns:a16="http://schemas.microsoft.com/office/drawing/2014/main" id="{CC9C50BE-75EE-324B-9B12-6EF6388A1032}"/>
+              </a:ext>
+            </a:extLst>
+          </p:cNvPr>
+          <p:cNvSpPr txBox="1"/>
+          <p:nvPr/>
+        </p:nvSpPr>
+        <p:spPr>
+          <a:xfrm>
+            <a:off x="3540990" y="3914883"/>
+            <a:ext cx="489530" cy="307777"/>
+          </a:xfrm>
+          <a:prstGeom prst="rect">
+            <a:avLst/>
+          </a:prstGeom>
+          <a:noFill/>
+        </p:spPr>
+        <p:txBody>
+          <a:bodyPr wrap="square" rtlCol="0">
+            <a:spAutoFit/>
+          </a:bodyPr>
+          <a:lstStyle/>
+          <a:p>
+            <a:pPr algn="ctr"/>
+            <a:r>
+              <a:rPr lang="en-US" sz="1400" dirty="0">
+                <a:latin typeface="CMU Serif Roman" panose="02000603000000000000" pitchFamily="2" charset="0"/>
+                <a:ea typeface="CMU Serif Roman" panose="02000603000000000000" pitchFamily="2" charset="0"/>
+                <a:cs typeface="CMU Serif Roman" panose="02000603000000000000" pitchFamily="2" charset="0"/>
+              </a:rPr>
+              <a:t>⊥</a:t>
+            </a:r>
+          </a:p>
+        </p:txBody>
+      </p:sp>
+      <p:sp>
+        <p:nvSpPr>
+          <p:cNvPr id="7" name="TextBox 6">
+            <a:extLst>
+              <a:ext uri="{FF2B5EF4-FFF2-40B4-BE49-F238E27FC236}">
+                <a16:creationId xmlns:a16="http://schemas.microsoft.com/office/drawing/2014/main" id="{9A032E13-9AAE-6940-9BA9-5B4B814B4709}"/>
+              </a:ext>
+            </a:extLst>
+          </p:cNvPr>
+          <p:cNvSpPr txBox="1"/>
+          <p:nvPr/>
+        </p:nvSpPr>
+        <p:spPr>
+          <a:xfrm>
+            <a:off x="3063170" y="3401252"/>
+            <a:ext cx="683491" cy="307777"/>
+          </a:xfrm>
+          <a:prstGeom prst="rect">
+            <a:avLst/>
+          </a:prstGeom>
+          <a:noFill/>
+        </p:spPr>
+        <p:txBody>
+          <a:bodyPr wrap="square" rtlCol="0">
+            <a:spAutoFit/>
+          </a:bodyPr>
+          <a:lstStyle/>
+          <a:p>
+            <a:pPr algn="ctr"/>
+            <a:r>
+              <a:rPr lang="en-US" sz="1400" dirty="0">
+                <a:latin typeface="CMU Serif Roman" panose="02000603000000000000" pitchFamily="2" charset="0"/>
+                <a:ea typeface="CMU Serif Roman" panose="02000603000000000000" pitchFamily="2" charset="0"/>
+                <a:cs typeface="CMU Serif Roman" panose="02000603000000000000" pitchFamily="2" charset="0"/>
+              </a:rPr>
+              <a:t>Zero</a:t>
+            </a:r>
+          </a:p>
+        </p:txBody>
+      </p:sp>
+      <p:sp>
+        <p:nvSpPr>
+          <p:cNvPr id="8" name="TextBox 7">
+            <a:extLst>
+              <a:ext uri="{FF2B5EF4-FFF2-40B4-BE49-F238E27FC236}">
+                <a16:creationId xmlns:a16="http://schemas.microsoft.com/office/drawing/2014/main" id="{733FD247-D115-B54C-B8BE-F0984E28EA40}"/>
+              </a:ext>
+            </a:extLst>
+          </p:cNvPr>
+          <p:cNvSpPr txBox="1"/>
+          <p:nvPr/>
+        </p:nvSpPr>
+        <p:spPr>
+          <a:xfrm>
+            <a:off x="3060204" y="2777639"/>
+            <a:ext cx="1203038" cy="307777"/>
+          </a:xfrm>
+          <a:prstGeom prst="rect">
+            <a:avLst/>
+          </a:prstGeom>
+          <a:noFill/>
+        </p:spPr>
+        <p:txBody>
+          <a:bodyPr wrap="square" rtlCol="0">
+            <a:spAutoFit/>
+          </a:bodyPr>
+          <a:lstStyle/>
+          <a:p>
+            <a:pPr algn="ctr"/>
+            <a:r>
+              <a:rPr lang="en-US" sz="1400" dirty="0" err="1">
+                <a:latin typeface="CMU Serif Roman" panose="02000603000000000000" pitchFamily="2" charset="0"/>
+                <a:ea typeface="CMU Serif Roman" panose="02000603000000000000" pitchFamily="2" charset="0"/>
+                <a:cs typeface="CMU Serif Roman" panose="02000603000000000000" pitchFamily="2" charset="0"/>
+              </a:rPr>
+              <a:t>Succ</a:t>
+            </a:r>
+            <a:r>
+              <a:rPr lang="en-US" sz="1400" dirty="0">
+                <a:latin typeface="CMU Serif Roman" panose="02000603000000000000" pitchFamily="2" charset="0"/>
+                <a:ea typeface="CMU Serif Roman" panose="02000603000000000000" pitchFamily="2" charset="0"/>
+                <a:cs typeface="CMU Serif Roman" panose="02000603000000000000" pitchFamily="2" charset="0"/>
+              </a:rPr>
+              <a:t> Zero</a:t>
+            </a:r>
+          </a:p>
+        </p:txBody>
+      </p:sp>
+      <p:sp>
+        <p:nvSpPr>
+          <p:cNvPr id="9" name="TextBox 8">
+            <a:extLst>
+              <a:ext uri="{FF2B5EF4-FFF2-40B4-BE49-F238E27FC236}">
+                <a16:creationId xmlns:a16="http://schemas.microsoft.com/office/drawing/2014/main" id="{A2744B08-B1A3-D949-B2FB-FE2B46831006}"/>
+              </a:ext>
+            </a:extLst>
+          </p:cNvPr>
+          <p:cNvSpPr txBox="1"/>
+          <p:nvPr/>
+        </p:nvSpPr>
+        <p:spPr>
+          <a:xfrm>
+            <a:off x="3447967" y="2105042"/>
+            <a:ext cx="1514763" cy="307777"/>
+          </a:xfrm>
+          <a:prstGeom prst="rect">
+            <a:avLst/>
+          </a:prstGeom>
+          <a:noFill/>
+        </p:spPr>
+        <p:txBody>
+          <a:bodyPr wrap="square" rtlCol="0">
+            <a:spAutoFit/>
+          </a:bodyPr>
+          <a:lstStyle/>
+          <a:p>
+            <a:pPr algn="ctr"/>
+            <a:r>
+              <a:rPr lang="en-US" sz="1400" dirty="0" err="1">
+                <a:latin typeface="CMU Serif Roman" panose="02000603000000000000" pitchFamily="2" charset="0"/>
+                <a:ea typeface="CMU Serif Roman" panose="02000603000000000000" pitchFamily="2" charset="0"/>
+                <a:cs typeface="CMU Serif Roman" panose="02000603000000000000" pitchFamily="2" charset="0"/>
+              </a:rPr>
+              <a:t>Succ</a:t>
+            </a:r>
+            <a:r>
+              <a:rPr lang="en-US" sz="1400" dirty="0">
+                <a:latin typeface="CMU Serif Roman" panose="02000603000000000000" pitchFamily="2" charset="0"/>
+                <a:ea typeface="CMU Serif Roman" panose="02000603000000000000" pitchFamily="2" charset="0"/>
+                <a:cs typeface="CMU Serif Roman" panose="02000603000000000000" pitchFamily="2" charset="0"/>
+              </a:rPr>
+              <a:t> (</a:t>
+            </a:r>
+            <a:r>
+              <a:rPr lang="en-US" sz="1400" dirty="0" err="1">
+                <a:latin typeface="CMU Serif Roman" panose="02000603000000000000" pitchFamily="2" charset="0"/>
+                <a:ea typeface="CMU Serif Roman" panose="02000603000000000000" pitchFamily="2" charset="0"/>
+                <a:cs typeface="CMU Serif Roman" panose="02000603000000000000" pitchFamily="2" charset="0"/>
+              </a:rPr>
+              <a:t>Succ</a:t>
+            </a:r>
+            <a:r>
+              <a:rPr lang="en-US" sz="1400" dirty="0">
+                <a:latin typeface="CMU Serif Roman" panose="02000603000000000000" pitchFamily="2" charset="0"/>
+                <a:ea typeface="CMU Serif Roman" panose="02000603000000000000" pitchFamily="2" charset="0"/>
+                <a:cs typeface="CMU Serif Roman" panose="02000603000000000000" pitchFamily="2" charset="0"/>
+              </a:rPr>
+              <a:t> Zero)</a:t>
+            </a:r>
+          </a:p>
+        </p:txBody>
+      </p:sp>
+      <p:cxnSp>
+        <p:nvCxnSpPr>
+          <p:cNvPr id="11" name="Straight Connector 10">
+            <a:extLst>
+              <a:ext uri="{FF2B5EF4-FFF2-40B4-BE49-F238E27FC236}">
+                <a16:creationId xmlns:a16="http://schemas.microsoft.com/office/drawing/2014/main" id="{6FBF3A44-B70C-3043-A440-202AD77C13A4}"/>
+              </a:ext>
+            </a:extLst>
+          </p:cNvPr>
+          <p:cNvCxnSpPr>
+            <a:cxnSpLocks/>
+          </p:cNvCxnSpPr>
+          <p:nvPr/>
+        </p:nvCxnSpPr>
+        <p:spPr>
+          <a:xfrm flipV="1">
+            <a:off x="3871356" y="3681351"/>
+            <a:ext cx="261258" cy="331493"/>
+          </a:xfrm>
+          <a:prstGeom prst="line">
+            <a:avLst/>
+          </a:prstGeom>
+          <a:ln>
+            <a:solidFill>
+              <a:schemeClr val="tx1"/>
+            </a:solidFill>
+          </a:ln>
+        </p:spPr>
+        <p:style>
+          <a:lnRef idx="1">
+            <a:schemeClr val="accent1"/>
+          </a:lnRef>
+          <a:fillRef idx="0">
+            <a:schemeClr val="accent1"/>
+          </a:fillRef>
+          <a:effectRef idx="0">
+            <a:schemeClr val="accent1"/>
+          </a:effectRef>
+          <a:fontRef idx="minor">
+            <a:schemeClr val="tx1"/>
+          </a:fontRef>
+        </p:style>
+      </p:cxnSp>
+      <p:cxnSp>
+        <p:nvCxnSpPr>
+          <p:cNvPr id="14" name="Straight Connector 13">
+            <a:extLst>
+              <a:ext uri="{FF2B5EF4-FFF2-40B4-BE49-F238E27FC236}">
+                <a16:creationId xmlns:a16="http://schemas.microsoft.com/office/drawing/2014/main" id="{4CB54E43-99B4-AE4B-9A18-A0AC80837723}"/>
+              </a:ext>
+            </a:extLst>
+          </p:cNvPr>
+          <p:cNvCxnSpPr>
+            <a:cxnSpLocks/>
+          </p:cNvCxnSpPr>
+          <p:nvPr/>
+        </p:nvCxnSpPr>
+        <p:spPr>
+          <a:xfrm flipV="1">
+            <a:off x="4339770" y="3069759"/>
+            <a:ext cx="261258" cy="331493"/>
+          </a:xfrm>
+          <a:prstGeom prst="line">
+            <a:avLst/>
+          </a:prstGeom>
+          <a:ln>
+            <a:solidFill>
+              <a:schemeClr val="tx1"/>
+            </a:solidFill>
+          </a:ln>
+        </p:spPr>
+        <p:style>
+          <a:lnRef idx="1">
+            <a:schemeClr val="accent1"/>
+          </a:lnRef>
+          <a:fillRef idx="0">
+            <a:schemeClr val="accent1"/>
+          </a:fillRef>
+          <a:effectRef idx="0">
+            <a:schemeClr val="accent1"/>
+          </a:effectRef>
+          <a:fontRef idx="minor">
+            <a:schemeClr val="tx1"/>
+          </a:fontRef>
+        </p:style>
+      </p:cxnSp>
+      <p:cxnSp>
+        <p:nvCxnSpPr>
+          <p:cNvPr id="16" name="Straight Connector 15">
+            <a:extLst>
+              <a:ext uri="{FF2B5EF4-FFF2-40B4-BE49-F238E27FC236}">
+                <a16:creationId xmlns:a16="http://schemas.microsoft.com/office/drawing/2014/main" id="{32A8B6FC-EB31-A34C-8A02-F8AA7D5AC859}"/>
+              </a:ext>
+            </a:extLst>
+          </p:cNvPr>
+          <p:cNvCxnSpPr>
+            <a:cxnSpLocks/>
+          </p:cNvCxnSpPr>
+          <p:nvPr/>
+        </p:nvCxnSpPr>
+        <p:spPr>
+          <a:xfrm flipH="1" flipV="1">
+            <a:off x="3437000" y="3681351"/>
+            <a:ext cx="238001" cy="318148"/>
+          </a:xfrm>
+          <a:prstGeom prst="line">
+            <a:avLst/>
+          </a:prstGeom>
+          <a:ln>
+            <a:solidFill>
+              <a:schemeClr val="tx1"/>
+            </a:solidFill>
+          </a:ln>
+        </p:spPr>
+        <p:style>
+          <a:lnRef idx="1">
+            <a:schemeClr val="accent1"/>
+          </a:lnRef>
+          <a:fillRef idx="0">
+            <a:schemeClr val="accent1"/>
+          </a:fillRef>
+          <a:effectRef idx="0">
+            <a:schemeClr val="accent1"/>
+          </a:effectRef>
+          <a:fontRef idx="minor">
+            <a:schemeClr val="tx1"/>
+          </a:fontRef>
+        </p:style>
+      </p:cxnSp>
+      <p:cxnSp>
+        <p:nvCxnSpPr>
+          <p:cNvPr id="18" name="Straight Connector 17">
+            <a:extLst>
+              <a:ext uri="{FF2B5EF4-FFF2-40B4-BE49-F238E27FC236}">
+                <a16:creationId xmlns:a16="http://schemas.microsoft.com/office/drawing/2014/main" id="{CC2D3F7E-6F06-1E4E-A5C9-BBF60DB991A2}"/>
+              </a:ext>
+            </a:extLst>
+          </p:cNvPr>
+          <p:cNvCxnSpPr>
+            <a:cxnSpLocks/>
+          </p:cNvCxnSpPr>
+          <p:nvPr/>
+        </p:nvCxnSpPr>
+        <p:spPr>
+          <a:xfrm flipH="1" flipV="1">
+            <a:off x="3756561" y="3058657"/>
+            <a:ext cx="238001" cy="318148"/>
+          </a:xfrm>
+          <a:prstGeom prst="line">
+            <a:avLst/>
+          </a:prstGeom>
+          <a:ln>
+            <a:solidFill>
+              <a:schemeClr val="tx1"/>
+            </a:solidFill>
+          </a:ln>
+        </p:spPr>
+        <p:style>
+          <a:lnRef idx="1">
+            <a:schemeClr val="accent1"/>
+          </a:lnRef>
+          <a:fillRef idx="0">
+            <a:schemeClr val="accent1"/>
+          </a:fillRef>
+          <a:effectRef idx="0">
+            <a:schemeClr val="accent1"/>
+          </a:effectRef>
+          <a:fontRef idx="minor">
+            <a:schemeClr val="tx1"/>
+          </a:fontRef>
+        </p:style>
+      </p:cxnSp>
+      <p:cxnSp>
+        <p:nvCxnSpPr>
+          <p:cNvPr id="20" name="Straight Connector 19">
+            <a:extLst>
+              <a:ext uri="{FF2B5EF4-FFF2-40B4-BE49-F238E27FC236}">
+                <a16:creationId xmlns:a16="http://schemas.microsoft.com/office/drawing/2014/main" id="{7B68F0CB-3794-F547-8FA6-B9A34CE8FC6B}"/>
+              </a:ext>
+            </a:extLst>
+          </p:cNvPr>
+          <p:cNvCxnSpPr>
+            <a:cxnSpLocks/>
+          </p:cNvCxnSpPr>
+          <p:nvPr/>
+        </p:nvCxnSpPr>
+        <p:spPr>
+          <a:xfrm flipH="1" flipV="1">
+            <a:off x="4197924" y="2436610"/>
+            <a:ext cx="238001" cy="318148"/>
+          </a:xfrm>
+          <a:prstGeom prst="line">
+            <a:avLst/>
+          </a:prstGeom>
+          <a:ln>
+            <a:solidFill>
+              <a:schemeClr val="tx1"/>
+            </a:solidFill>
+          </a:ln>
+        </p:spPr>
+        <p:style>
+          <a:lnRef idx="1">
+            <a:schemeClr val="accent1"/>
+          </a:lnRef>
+          <a:fillRef idx="0">
+            <a:schemeClr val="accent1"/>
+          </a:fillRef>
+          <a:effectRef idx="0">
+            <a:schemeClr val="accent1"/>
+          </a:effectRef>
+          <a:fontRef idx="minor">
+            <a:schemeClr val="tx1"/>
+          </a:fontRef>
+        </p:style>
+      </p:cxnSp>
+      <p:cxnSp>
+        <p:nvCxnSpPr>
+          <p:cNvPr id="21" name="Straight Connector 20">
+            <a:extLst>
+              <a:ext uri="{FF2B5EF4-FFF2-40B4-BE49-F238E27FC236}">
+                <a16:creationId xmlns:a16="http://schemas.microsoft.com/office/drawing/2014/main" id="{EA8338F1-2134-F942-B10B-765B71DEA508}"/>
+              </a:ext>
+            </a:extLst>
+          </p:cNvPr>
+          <p:cNvCxnSpPr>
+            <a:cxnSpLocks/>
+          </p:cNvCxnSpPr>
+          <p:nvPr/>
+        </p:nvCxnSpPr>
+        <p:spPr>
+          <a:xfrm flipV="1">
+            <a:off x="4891479" y="1543792"/>
+            <a:ext cx="974931" cy="1168594"/>
+          </a:xfrm>
+          <a:prstGeom prst="line">
+            <a:avLst/>
+          </a:prstGeom>
+          <a:ln>
+            <a:solidFill>
+              <a:schemeClr val="tx1"/>
+            </a:solidFill>
+            <a:prstDash val="dash"/>
+          </a:ln>
+        </p:spPr>
+        <p:style>
+          <a:lnRef idx="1">
+            <a:schemeClr val="accent1"/>
+          </a:lnRef>
+          <a:fillRef idx="0">
+            <a:schemeClr val="accent1"/>
+          </a:fillRef>
+          <a:effectRef idx="0">
+            <a:schemeClr val="accent1"/>
+          </a:effectRef>
+          <a:fontRef idx="minor">
+            <a:schemeClr val="tx1"/>
+          </a:fontRef>
+        </p:style>
+      </p:cxnSp>
+      <p:sp>
+        <p:nvSpPr>
+          <p:cNvPr id="23" name="TextBox 22">
+            <a:extLst>
+              <a:ext uri="{FF2B5EF4-FFF2-40B4-BE49-F238E27FC236}">
+                <a16:creationId xmlns:a16="http://schemas.microsoft.com/office/drawing/2014/main" id="{30E3A47C-2336-5C41-AB9A-BCAB9FF281F4}"/>
+              </a:ext>
+            </a:extLst>
+          </p:cNvPr>
+          <p:cNvSpPr txBox="1"/>
+          <p:nvPr/>
+        </p:nvSpPr>
+        <p:spPr>
+          <a:xfrm>
+            <a:off x="5638139" y="1283515"/>
+            <a:ext cx="527792" cy="307777"/>
+          </a:xfrm>
+          <a:prstGeom prst="rect">
+            <a:avLst/>
+          </a:prstGeom>
+          <a:noFill/>
+        </p:spPr>
+        <p:txBody>
+          <a:bodyPr wrap="square" rtlCol="0">
+            <a:spAutoFit/>
+          </a:bodyPr>
+          <a:lstStyle/>
+          <a:p>
+            <a:pPr algn="ctr"/>
+            <a:r>
+              <a:rPr lang="en-US" sz="1400" dirty="0">
+                <a:latin typeface="CMU Serif Roman" panose="02000603000000000000" pitchFamily="2" charset="0"/>
+                <a:ea typeface="CMU Serif Roman" panose="02000603000000000000" pitchFamily="2" charset="0"/>
+                <a:cs typeface="CMU Serif Roman" panose="02000603000000000000" pitchFamily="2" charset="0"/>
+              </a:rPr>
+              <a:t>∞</a:t>
+            </a:r>
+          </a:p>
+        </p:txBody>
+      </p:sp>
+    </p:spTree>
+    <p:extLst>
+      <p:ext uri="{BB962C8B-B14F-4D97-AF65-F5344CB8AC3E}">
+        <p14:creationId xmlns:p14="http://schemas.microsoft.com/office/powerpoint/2010/main" val="2188315920"/>
+      </p:ext>
+    </p:extLst>
+  </p:cSld>
+  <p:clrMapOvr>
+    <a:masterClrMapping/>
+  </p:clrMapOvr>
+</p:sld>
+</file>
+
+<file path=ppt/slides/slide6.xml><?xml version="1.0" encoding="utf-8"?>
+<p:sld xmlns:a="http://schemas.openxmlformats.org/drawingml/2006/main" xmlns:r="http://schemas.openxmlformats.org/officeDocument/2006/relationships" xmlns:p="http://schemas.openxmlformats.org/presentationml/2006/main">
+  <p:cSld>
+    <p:spTree>
+      <p:nvGrpSpPr>
+        <p:cNvPr id="1" name=""/>
+        <p:cNvGrpSpPr/>
+        <p:nvPr/>
+      </p:nvGrpSpPr>
+      <p:grpSpPr>
+        <a:xfrm>
+          <a:off x="0" y="0"/>
+          <a:ext cx="0" cy="0"/>
+          <a:chOff x="0" y="0"/>
+          <a:chExt cx="0" cy="0"/>
+        </a:xfrm>
+      </p:grpSpPr>
+      <p:sp>
+        <p:nvSpPr>
+          <p:cNvPr id="6" name="TextBox 5">
+            <a:extLst>
+              <a:ext uri="{FF2B5EF4-FFF2-40B4-BE49-F238E27FC236}">
+                <a16:creationId xmlns:a16="http://schemas.microsoft.com/office/drawing/2014/main" id="{48426967-50B7-1A47-9C08-086CFC044089}"/>
+              </a:ext>
+            </a:extLst>
+          </p:cNvPr>
+          <p:cNvSpPr txBox="1"/>
+          <p:nvPr/>
+        </p:nvSpPr>
+        <p:spPr>
+          <a:xfrm>
+            <a:off x="3540990" y="3914883"/>
+            <a:ext cx="489530" cy="307777"/>
+          </a:xfrm>
+          <a:prstGeom prst="rect">
+            <a:avLst/>
+          </a:prstGeom>
+          <a:noFill/>
+        </p:spPr>
+        <p:txBody>
+          <a:bodyPr wrap="square" rtlCol="0">
+            <a:spAutoFit/>
+          </a:bodyPr>
+          <a:lstStyle/>
+          <a:p>
+            <a:pPr algn="ctr"/>
+            <a:r>
+              <a:rPr lang="en-US" sz="1400" dirty="0">
+                <a:latin typeface="CMU Serif Roman" panose="02000603000000000000" pitchFamily="2" charset="0"/>
+                <a:ea typeface="CMU Serif Roman" panose="02000603000000000000" pitchFamily="2" charset="0"/>
+                <a:cs typeface="CMU Serif Roman" panose="02000603000000000000" pitchFamily="2" charset="0"/>
+              </a:rPr>
+              <a:t>⊥</a:t>
+            </a:r>
+          </a:p>
+        </p:txBody>
+      </p:sp>
+      <p:sp>
+        <p:nvSpPr>
+          <p:cNvPr id="7" name="TextBox 6">
+            <a:extLst>
+              <a:ext uri="{FF2B5EF4-FFF2-40B4-BE49-F238E27FC236}">
+                <a16:creationId xmlns:a16="http://schemas.microsoft.com/office/drawing/2014/main" id="{52A4AB6F-C1D9-4F40-B517-4DEF24C045AC}"/>
+              </a:ext>
+            </a:extLst>
+          </p:cNvPr>
+          <p:cNvSpPr txBox="1"/>
+          <p:nvPr/>
+        </p:nvSpPr>
+        <p:spPr>
+          <a:xfrm>
+            <a:off x="2488376" y="3375538"/>
+            <a:ext cx="683491" cy="307777"/>
+          </a:xfrm>
+          <a:prstGeom prst="rect">
+            <a:avLst/>
+          </a:prstGeom>
+          <a:noFill/>
+        </p:spPr>
+        <p:txBody>
+          <a:bodyPr wrap="square" rtlCol="0">
+            <a:spAutoFit/>
+          </a:bodyPr>
+          <a:lstStyle/>
+          <a:p>
+            <a:pPr algn="ctr"/>
+            <a:r>
+              <a:rPr lang="en-US" sz="1400" dirty="0">
+                <a:latin typeface="CMU Serif Roman" panose="02000603000000000000" pitchFamily="2" charset="0"/>
+                <a:ea typeface="CMU Serif Roman" panose="02000603000000000000" pitchFamily="2" charset="0"/>
+                <a:cs typeface="CMU Serif Roman" panose="02000603000000000000" pitchFamily="2" charset="0"/>
+              </a:rPr>
+              <a:t>Zero</a:t>
+            </a:r>
+          </a:p>
+        </p:txBody>
+      </p:sp>
+      <p:sp>
+        <p:nvSpPr>
+          <p:cNvPr id="8" name="TextBox 7">
+            <a:extLst>
+              <a:ext uri="{FF2B5EF4-FFF2-40B4-BE49-F238E27FC236}">
+                <a16:creationId xmlns:a16="http://schemas.microsoft.com/office/drawing/2014/main" id="{9E830783-AA5E-6842-8E4C-53611EC1C9B5}"/>
+              </a:ext>
+            </a:extLst>
+          </p:cNvPr>
+          <p:cNvSpPr txBox="1"/>
+          <p:nvPr/>
+        </p:nvSpPr>
+        <p:spPr>
+          <a:xfrm>
+            <a:off x="3120982" y="3361699"/>
+            <a:ext cx="957038" cy="307777"/>
+          </a:xfrm>
+          <a:prstGeom prst="rect">
+            <a:avLst/>
+          </a:prstGeom>
+          <a:noFill/>
+        </p:spPr>
+        <p:txBody>
+          <a:bodyPr wrap="square" rtlCol="0">
+            <a:spAutoFit/>
+          </a:bodyPr>
+          <a:lstStyle/>
+          <a:p>
+            <a:pPr algn="ctr"/>
+            <a:r>
+              <a:rPr lang="en-US" sz="1400" dirty="0" err="1">
+                <a:latin typeface="CMU Serif Roman" panose="02000603000000000000" pitchFamily="2" charset="0"/>
+                <a:ea typeface="CMU Serif Roman" panose="02000603000000000000" pitchFamily="2" charset="0"/>
+                <a:cs typeface="CMU Serif Roman" panose="02000603000000000000" pitchFamily="2" charset="0"/>
+              </a:rPr>
+              <a:t>Succ</a:t>
+            </a:r>
+            <a:r>
+              <a:rPr lang="en-US" sz="1400" dirty="0">
+                <a:latin typeface="CMU Serif Roman" panose="02000603000000000000" pitchFamily="2" charset="0"/>
+                <a:ea typeface="CMU Serif Roman" panose="02000603000000000000" pitchFamily="2" charset="0"/>
+                <a:cs typeface="CMU Serif Roman" panose="02000603000000000000" pitchFamily="2" charset="0"/>
+              </a:rPr>
+              <a:t> Zero</a:t>
+            </a:r>
+          </a:p>
+        </p:txBody>
+      </p:sp>
+      <p:sp>
+        <p:nvSpPr>
+          <p:cNvPr id="9" name="TextBox 8">
+            <a:extLst>
+              <a:ext uri="{FF2B5EF4-FFF2-40B4-BE49-F238E27FC236}">
+                <a16:creationId xmlns:a16="http://schemas.microsoft.com/office/drawing/2014/main" id="{C7621DBB-F688-B74A-A3ED-E6629474316D}"/>
+              </a:ext>
+            </a:extLst>
+          </p:cNvPr>
+          <p:cNvSpPr txBox="1"/>
+          <p:nvPr/>
+        </p:nvSpPr>
+        <p:spPr>
+          <a:xfrm>
+            <a:off x="4042517" y="3361699"/>
+            <a:ext cx="1514763" cy="307777"/>
+          </a:xfrm>
+          <a:prstGeom prst="rect">
+            <a:avLst/>
+          </a:prstGeom>
+          <a:noFill/>
+        </p:spPr>
+        <p:txBody>
+          <a:bodyPr wrap="square" rtlCol="0">
+            <a:spAutoFit/>
+          </a:bodyPr>
+          <a:lstStyle/>
+          <a:p>
+            <a:pPr algn="ctr"/>
+            <a:r>
+              <a:rPr lang="en-US" sz="1400" dirty="0" err="1">
+                <a:latin typeface="CMU Serif Roman" panose="02000603000000000000" pitchFamily="2" charset="0"/>
+                <a:ea typeface="CMU Serif Roman" panose="02000603000000000000" pitchFamily="2" charset="0"/>
+                <a:cs typeface="CMU Serif Roman" panose="02000603000000000000" pitchFamily="2" charset="0"/>
+              </a:rPr>
+              <a:t>Succ</a:t>
+            </a:r>
+            <a:r>
+              <a:rPr lang="en-US" sz="1400" dirty="0">
+                <a:latin typeface="CMU Serif Roman" panose="02000603000000000000" pitchFamily="2" charset="0"/>
+                <a:ea typeface="CMU Serif Roman" panose="02000603000000000000" pitchFamily="2" charset="0"/>
+                <a:cs typeface="CMU Serif Roman" panose="02000603000000000000" pitchFamily="2" charset="0"/>
+              </a:rPr>
+              <a:t> (</a:t>
+            </a:r>
+            <a:r>
+              <a:rPr lang="en-US" sz="1400" dirty="0" err="1">
+                <a:latin typeface="CMU Serif Roman" panose="02000603000000000000" pitchFamily="2" charset="0"/>
+                <a:ea typeface="CMU Serif Roman" panose="02000603000000000000" pitchFamily="2" charset="0"/>
+                <a:cs typeface="CMU Serif Roman" panose="02000603000000000000" pitchFamily="2" charset="0"/>
+              </a:rPr>
+              <a:t>Succ</a:t>
+            </a:r>
+            <a:r>
+              <a:rPr lang="en-US" sz="1400" dirty="0">
+                <a:latin typeface="CMU Serif Roman" panose="02000603000000000000" pitchFamily="2" charset="0"/>
+                <a:ea typeface="CMU Serif Roman" panose="02000603000000000000" pitchFamily="2" charset="0"/>
+                <a:cs typeface="CMU Serif Roman" panose="02000603000000000000" pitchFamily="2" charset="0"/>
+              </a:rPr>
+              <a:t> Zero)</a:t>
+            </a:r>
+          </a:p>
+        </p:txBody>
+      </p:sp>
+      <p:cxnSp>
+        <p:nvCxnSpPr>
+          <p:cNvPr id="10" name="Straight Connector 9">
+            <a:extLst>
+              <a:ext uri="{FF2B5EF4-FFF2-40B4-BE49-F238E27FC236}">
+                <a16:creationId xmlns:a16="http://schemas.microsoft.com/office/drawing/2014/main" id="{27981DFD-EDB0-A942-A706-50AED9BB0032}"/>
+              </a:ext>
+            </a:extLst>
+          </p:cNvPr>
+          <p:cNvCxnSpPr>
+            <a:cxnSpLocks/>
+            <a:stCxn id="6" idx="0"/>
+            <a:endCxn id="8" idx="2"/>
+          </p:cNvCxnSpPr>
+          <p:nvPr/>
+        </p:nvCxnSpPr>
+        <p:spPr>
+          <a:xfrm flipH="1" flipV="1">
+            <a:off x="3599501" y="3669476"/>
+            <a:ext cx="186254" cy="245407"/>
+          </a:xfrm>
+          <a:prstGeom prst="line">
+            <a:avLst/>
+          </a:prstGeom>
+          <a:ln>
+            <a:solidFill>
+              <a:schemeClr val="tx1"/>
+            </a:solidFill>
+          </a:ln>
+        </p:spPr>
+        <p:style>
+          <a:lnRef idx="1">
+            <a:schemeClr val="accent1"/>
+          </a:lnRef>
+          <a:fillRef idx="0">
+            <a:schemeClr val="accent1"/>
+          </a:fillRef>
+          <a:effectRef idx="0">
+            <a:schemeClr val="accent1"/>
+          </a:effectRef>
+          <a:fontRef idx="minor">
+            <a:schemeClr val="tx1"/>
+          </a:fontRef>
+        </p:style>
+      </p:cxnSp>
+      <p:cxnSp>
+        <p:nvCxnSpPr>
+          <p:cNvPr id="12" name="Straight Connector 11">
+            <a:extLst>
+              <a:ext uri="{FF2B5EF4-FFF2-40B4-BE49-F238E27FC236}">
+                <a16:creationId xmlns:a16="http://schemas.microsoft.com/office/drawing/2014/main" id="{97D39BF1-3EB6-C94F-A5CA-53B1DAFEE33F}"/>
+              </a:ext>
+            </a:extLst>
+          </p:cNvPr>
+          <p:cNvCxnSpPr>
+            <a:cxnSpLocks/>
+            <a:endCxn id="7" idx="2"/>
+          </p:cNvCxnSpPr>
+          <p:nvPr/>
+        </p:nvCxnSpPr>
+        <p:spPr>
+          <a:xfrm flipH="1" flipV="1">
+            <a:off x="2830122" y="3683315"/>
+            <a:ext cx="844880" cy="316184"/>
+          </a:xfrm>
+          <a:prstGeom prst="line">
+            <a:avLst/>
+          </a:prstGeom>
+          <a:ln>
+            <a:solidFill>
+              <a:schemeClr val="tx1"/>
+            </a:solidFill>
+          </a:ln>
+        </p:spPr>
+        <p:style>
+          <a:lnRef idx="1">
+            <a:schemeClr val="accent1"/>
+          </a:lnRef>
+          <a:fillRef idx="0">
+            <a:schemeClr val="accent1"/>
+          </a:fillRef>
+          <a:effectRef idx="0">
+            <a:schemeClr val="accent1"/>
+          </a:effectRef>
+          <a:fontRef idx="minor">
+            <a:schemeClr val="tx1"/>
+          </a:fontRef>
+        </p:style>
+      </p:cxnSp>
+      <p:cxnSp>
+        <p:nvCxnSpPr>
+          <p:cNvPr id="21" name="Straight Connector 20">
+            <a:extLst>
+              <a:ext uri="{FF2B5EF4-FFF2-40B4-BE49-F238E27FC236}">
+                <a16:creationId xmlns:a16="http://schemas.microsoft.com/office/drawing/2014/main" id="{F58278A2-D446-274E-BA93-8D61A108EFCB}"/>
+              </a:ext>
+            </a:extLst>
+          </p:cNvPr>
+          <p:cNvCxnSpPr>
+            <a:cxnSpLocks/>
+            <a:endCxn id="9" idx="2"/>
+          </p:cNvCxnSpPr>
+          <p:nvPr/>
+        </p:nvCxnSpPr>
+        <p:spPr>
+          <a:xfrm flipV="1">
+            <a:off x="3917496" y="3669476"/>
+            <a:ext cx="882403" cy="330023"/>
+          </a:xfrm>
+          <a:prstGeom prst="line">
+            <a:avLst/>
+          </a:prstGeom>
+          <a:ln>
+            <a:solidFill>
+              <a:schemeClr val="tx1"/>
+            </a:solidFill>
+          </a:ln>
+        </p:spPr>
+        <p:style>
+          <a:lnRef idx="1">
+            <a:schemeClr val="accent1"/>
+          </a:lnRef>
+          <a:fillRef idx="0">
+            <a:schemeClr val="accent1"/>
+          </a:fillRef>
+          <a:effectRef idx="0">
+            <a:schemeClr val="accent1"/>
+          </a:effectRef>
+          <a:fontRef idx="minor">
+            <a:schemeClr val="tx1"/>
+          </a:fontRef>
+        </p:style>
+      </p:cxnSp>
+      <p:sp>
+        <p:nvSpPr>
+          <p:cNvPr id="25" name="TextBox 24">
+            <a:extLst>
+              <a:ext uri="{FF2B5EF4-FFF2-40B4-BE49-F238E27FC236}">
+                <a16:creationId xmlns:a16="http://schemas.microsoft.com/office/drawing/2014/main" id="{0195F0C5-5FCC-2047-B244-36E27731911C}"/>
+              </a:ext>
+            </a:extLst>
+          </p:cNvPr>
+          <p:cNvSpPr txBox="1"/>
+          <p:nvPr/>
+        </p:nvSpPr>
+        <p:spPr>
+          <a:xfrm>
+            <a:off x="5456053" y="3345849"/>
+            <a:ext cx="489530" cy="307777"/>
+          </a:xfrm>
+          <a:prstGeom prst="rect">
+            <a:avLst/>
+          </a:prstGeom>
+          <a:noFill/>
+        </p:spPr>
+        <p:txBody>
+          <a:bodyPr wrap="square" rtlCol="0">
+            <a:spAutoFit/>
+          </a:bodyPr>
+          <a:lstStyle/>
+          <a:p>
+            <a:pPr algn="ctr"/>
+            <a:r>
+              <a:rPr lang="en-US" sz="1400" dirty="0">
+                <a:latin typeface="CMU Serif Roman" panose="02000603000000000000" pitchFamily="2" charset="0"/>
+                <a:ea typeface="CMU Serif Roman" panose="02000603000000000000" pitchFamily="2" charset="0"/>
+                <a:cs typeface="CMU Serif Roman" panose="02000603000000000000" pitchFamily="2" charset="0"/>
+              </a:rPr>
+              <a:t>…</a:t>
+            </a:r>
+          </a:p>
+        </p:txBody>
+      </p:sp>
+    </p:spTree>
+    <p:extLst>
+      <p:ext uri="{BB962C8B-B14F-4D97-AF65-F5344CB8AC3E}">
+        <p14:creationId xmlns:p14="http://schemas.microsoft.com/office/powerpoint/2010/main" val="4223803615"/>
+      </p:ext>
+    </p:extLst>
+  </p:cSld>
+  <p:clrMapOvr>
+    <a:masterClrMapping/>
+  </p:clrMapOvr>
+</p:sld>
+</file>
+
 <file path=ppt/theme/theme1.xml><?xml version="1.0" encoding="utf-8"?>
 <a:theme xmlns:a="http://schemas.openxmlformats.org/drawingml/2006/main" name="Office Theme">
   <a:themeElements>

</xml_diff>